<commit_message>
fixing typos on tiered navigation
</commit_message>
<xml_diff>
--- a/murach_html_4e/slides/Chapter 7 slides (Revised).pptx
+++ b/murach_html_4e/slides/Chapter 7 slides (Revised).pptx
@@ -381,7 +381,7 @@
               <a:pPr>
                 <a:defRPr/>
               </a:pPr>
-              <a:t>6/16/2020</a:t>
+              <a:t>6/17/2020</a:t>
             </a:fld>
             <a:endParaRPr lang="en-US"/>
           </a:p>
@@ -22882,10 +22882,10 @@
                 <a:ea typeface="Times New Roman" panose="02020603050405020304" pitchFamily="18" charset="0"/>
                 <a:cs typeface="Times New Roman" panose="02020603050405020304" pitchFamily="18" charset="0"/>
               </a:rPr>
-              <a:t>nav_menu</a:t>
-            </a:r>
-            <a:r>
-              <a:rPr lang="en-US" sz="1600" b="1" dirty="0">
+              <a:t>nav</a:t>
+            </a:r>
+            <a:r>
+              <a:rPr lang="en-US" sz="1600" b="1" err="1">
                 <a:highlight>
                   <a:srgbClr val="FFFFFF"/>
                 </a:highlight>
@@ -22893,7 +22893,18 @@
                 <a:ea typeface="Times New Roman" panose="02020603050405020304" pitchFamily="18" charset="0"/>
                 <a:cs typeface="Times New Roman" panose="02020603050405020304" pitchFamily="18" charset="0"/>
               </a:rPr>
-              <a:t> </a:t>
+              <a:t>_</a:t>
+            </a:r>
+            <a:r>
+              <a:rPr lang="en-US" sz="1600" b="1">
+                <a:highlight>
+                  <a:srgbClr val="FFFFFF"/>
+                </a:highlight>
+                <a:latin typeface="Courier New" panose="02070309020205020404" pitchFamily="49" charset="0"/>
+                <a:ea typeface="Times New Roman" panose="02020603050405020304" pitchFamily="18" charset="0"/>
+                <a:cs typeface="Times New Roman" panose="02020603050405020304" pitchFamily="18" charset="0"/>
+              </a:rPr>
+              <a:t>menu_3 </a:t>
             </a:r>
             <a:r>
               <a:rPr lang="en-US" sz="1600" b="1" dirty="0" err="1">
@@ -24902,7 +24913,7 @@
                 <a:ea typeface="Times New Roman" panose="02020603050405020304" pitchFamily="18" charset="0"/>
                 <a:cs typeface="Times New Roman" panose="02020603050405020304" pitchFamily="18" charset="0"/>
               </a:rPr>
-              <a:t>li { float</a:t>
+              <a:t>li { display: block; float</a:t>
             </a:r>
             <a:r>
               <a:rPr lang="en-US" sz="1400" b="1" dirty="0">
@@ -25877,7 +25888,7 @@
                 <a:ea typeface="Times New Roman" panose="02020603050405020304" pitchFamily="18" charset="0"/>
                 <a:cs typeface="Times New Roman" panose="02020603050405020304" pitchFamily="18" charset="0"/>
               </a:rPr>
-              <a:t>#nav_menu_3 ul { list-style: none; }</a:t>
+              <a:t>#nav_menu ul li a {</a:t>
             </a:r>
           </a:p>
           <a:p>
@@ -25898,7 +25909,7 @@
                 <a:ea typeface="Times New Roman" panose="02020603050405020304" pitchFamily="18" charset="0"/>
                 <a:cs typeface="Times New Roman" panose="02020603050405020304" pitchFamily="18" charset="0"/>
               </a:rPr>
-              <a:t>#nav_menu_3 ul li { display: block; float: left; }</a:t>
+              <a:t>    display: block;</a:t>
             </a:r>
           </a:p>
           <a:p>
@@ -25919,7 +25930,7 @@
                 <a:ea typeface="Times New Roman" panose="02020603050405020304" pitchFamily="18" charset="0"/>
                 <a:cs typeface="Times New Roman" panose="02020603050405020304" pitchFamily="18" charset="0"/>
               </a:rPr>
-              <a:t>#nav_menu_3 ul li a {</a:t>
+              <a:t>    width: 175px;</a:t>
             </a:r>
           </a:p>
           <a:p>
@@ -25940,7 +25951,7 @@
                 <a:ea typeface="Times New Roman" panose="02020603050405020304" pitchFamily="18" charset="0"/>
                 <a:cs typeface="Times New Roman" panose="02020603050405020304" pitchFamily="18" charset="0"/>
               </a:rPr>
-              <a:t>    display: block;</a:t>
+              <a:t>    text-align: center; </a:t>
             </a:r>
           </a:p>
           <a:p>
@@ -25961,7 +25972,7 @@
                 <a:ea typeface="Times New Roman" panose="02020603050405020304" pitchFamily="18" charset="0"/>
                 <a:cs typeface="Times New Roman" panose="02020603050405020304" pitchFamily="18" charset="0"/>
               </a:rPr>
-              <a:t>    width: 175px;</a:t>
+              <a:t>    text-decoration: none;</a:t>
             </a:r>
           </a:p>
           <a:p>
@@ -25982,7 +25993,7 @@
                 <a:ea typeface="Times New Roman" panose="02020603050405020304" pitchFamily="18" charset="0"/>
                 <a:cs typeface="Times New Roman" panose="02020603050405020304" pitchFamily="18" charset="0"/>
               </a:rPr>
-              <a:t>    text-align: center; </a:t>
+              <a:t>    background-color: blue;</a:t>
             </a:r>
           </a:p>
           <a:p>
@@ -26003,7 +26014,7 @@
                 <a:ea typeface="Times New Roman" panose="02020603050405020304" pitchFamily="18" charset="0"/>
                 <a:cs typeface="Times New Roman" panose="02020603050405020304" pitchFamily="18" charset="0"/>
               </a:rPr>
-              <a:t>    text-decoration: none;</a:t>
+              <a:t>    color: white;</a:t>
             </a:r>
           </a:p>
           <a:p>
@@ -26024,7 +26035,7 @@
                 <a:ea typeface="Times New Roman" panose="02020603050405020304" pitchFamily="18" charset="0"/>
                 <a:cs typeface="Times New Roman" panose="02020603050405020304" pitchFamily="18" charset="0"/>
               </a:rPr>
-              <a:t>    background-color: blue;</a:t>
+              <a:t>}</a:t>
             </a:r>
           </a:p>
           <a:p>
@@ -26039,35 +26050,11 @@
                 <a:tab pos="1371600" algn="l"/>
               </a:tabLst>
             </a:pPr>
-            <a:r>
-              <a:rPr lang="en-US" sz="1400" b="1">
-                <a:latin typeface="Courier New" panose="02070309020205020404" pitchFamily="49" charset="0"/>
-                <a:ea typeface="Times New Roman" panose="02020603050405020304" pitchFamily="18" charset="0"/>
-                <a:cs typeface="Times New Roman" panose="02020603050405020304" pitchFamily="18" charset="0"/>
-              </a:rPr>
-              <a:t>    color: white;</a:t>
-            </a:r>
-          </a:p>
-          <a:p>
-            <a:pPr marR="0">
-              <a:spcBef>
-                <a:spcPts val="0"/>
-              </a:spcBef>
-              <a:spcAft>
-                <a:spcPts val="0"/>
-              </a:spcAft>
-              <a:tabLst>
-                <a:tab pos="1371600" algn="l"/>
-              </a:tabLst>
-            </a:pPr>
-            <a:r>
-              <a:rPr lang="en-US" sz="1400" b="1">
-                <a:latin typeface="Courier New" panose="02070309020205020404" pitchFamily="49" charset="0"/>
-                <a:ea typeface="Times New Roman" panose="02020603050405020304" pitchFamily="18" charset="0"/>
-                <a:cs typeface="Times New Roman" panose="02020603050405020304" pitchFamily="18" charset="0"/>
-              </a:rPr>
-              <a:t>}</a:t>
-            </a:r>
+            <a:endParaRPr lang="en-US" sz="1400" b="1">
+              <a:latin typeface="Courier New" panose="02070309020205020404" pitchFamily="49" charset="0"/>
+              <a:ea typeface="Times New Roman" panose="02020603050405020304" pitchFamily="18" charset="0"/>
+              <a:cs typeface="Times New Roman" panose="02020603050405020304" pitchFamily="18" charset="0"/>
+            </a:endParaRPr>
           </a:p>
           <a:p>
             <a:pPr marR="0">

</xml_diff>

<commit_message>
Adding last slide about assignments
</commit_message>
<xml_diff>
--- a/murach_html_4e/slides/Chapter 7 slides (Revised).pptx
+++ b/murach_html_4e/slides/Chapter 7 slides (Revised).pptx
@@ -5,10 +5,10 @@
     <p:sldMasterId id="2147483669" r:id="rId1"/>
   </p:sldMasterIdLst>
   <p:notesMasterIdLst>
-    <p:notesMasterId r:id="rId54"/>
+    <p:notesMasterId r:id="rId55"/>
   </p:notesMasterIdLst>
   <p:handoutMasterIdLst>
-    <p:handoutMasterId r:id="rId55"/>
+    <p:handoutMasterId r:id="rId56"/>
   </p:handoutMasterIdLst>
   <p:sldIdLst>
     <p:sldId id="256" r:id="rId2"/>
@@ -63,6 +63,7 @@
     <p:sldId id="309" r:id="rId51"/>
     <p:sldId id="310" r:id="rId52"/>
     <p:sldId id="314" r:id="rId53"/>
+    <p:sldId id="322" r:id="rId54"/>
   </p:sldIdLst>
   <p:sldSz cx="9144000" cy="6858000" type="screen4x3"/>
   <p:notesSz cx="7010400" cy="9296400"/>
@@ -30065,6 +30066,244 @@
     <p:extLst>
       <p:ext uri="{BB962C8B-B14F-4D97-AF65-F5344CB8AC3E}">
         <p14:creationId xmlns:p14="http://schemas.microsoft.com/office/powerpoint/2010/main" val="1599739048"/>
+      </p:ext>
+    </p:extLst>
+  </p:cSld>
+  <p:clrMapOvr>
+    <a:masterClrMapping/>
+  </p:clrMapOvr>
+</p:sld>
+</file>
+
+<file path=ppt/slides/slide53.xml><?xml version="1.0" encoding="utf-8"?>
+<p:sld xmlns:a="http://schemas.openxmlformats.org/drawingml/2006/main" xmlns:r="http://schemas.openxmlformats.org/officeDocument/2006/relationships" xmlns:p="http://schemas.openxmlformats.org/presentationml/2006/main">
+  <p:cSld>
+    <p:spTree>
+      <p:nvGrpSpPr>
+        <p:cNvPr id="1" name=""/>
+        <p:cNvGrpSpPr/>
+        <p:nvPr/>
+      </p:nvGrpSpPr>
+      <p:grpSpPr>
+        <a:xfrm>
+          <a:off x="0" y="0"/>
+          <a:ext cx="0" cy="0"/>
+          <a:chOff x="0" y="0"/>
+          <a:chExt cx="0" cy="0"/>
+        </a:xfrm>
+      </p:grpSpPr>
+      <p:sp>
+        <p:nvSpPr>
+          <p:cNvPr id="2" name="Title 1">
+            <a:extLst>
+              <a:ext uri="{FF2B5EF4-FFF2-40B4-BE49-F238E27FC236}">
+                <a16:creationId xmlns:a16="http://schemas.microsoft.com/office/drawing/2014/main" id="{ED7252AE-FA2E-4E58-B391-A15BE3EEC3E1}"/>
+              </a:ext>
+            </a:extLst>
+          </p:cNvPr>
+          <p:cNvSpPr>
+            <a:spLocks noGrp="1"/>
+          </p:cNvSpPr>
+          <p:nvPr>
+            <p:ph type="title"/>
+          </p:nvPr>
+        </p:nvSpPr>
+        <p:spPr/>
+        <p:txBody>
+          <a:bodyPr/>
+          <a:lstStyle/>
+          <a:p>
+            <a:pPr marL="0" marR="0">
+              <a:spcBef>
+                <a:spcPts val="0"/>
+              </a:spcBef>
+              <a:spcAft>
+                <a:spcPts val="600"/>
+              </a:spcAft>
+              <a:tabLst>
+                <a:tab pos="1371600" algn="l"/>
+              </a:tabLst>
+            </a:pPr>
+            <a:r>
+              <a:rPr lang="en-US">
+                <a:latin typeface="Arial" panose="020B0604020202020204" pitchFamily="34" charset="0"/>
+                <a:ea typeface="Times New Roman" panose="02020603050405020304" pitchFamily="18" charset="0"/>
+                <a:cs typeface="Times New Roman" panose="02020603050405020304" pitchFamily="18" charset="0"/>
+              </a:rPr>
+              <a:t>Assignments</a:t>
+            </a:r>
+            <a:endParaRPr lang="en-US" dirty="0"/>
+          </a:p>
+        </p:txBody>
+      </p:sp>
+      <p:sp>
+        <p:nvSpPr>
+          <p:cNvPr id="3" name="Text Placeholder 2">
+            <a:extLst>
+              <a:ext uri="{FF2B5EF4-FFF2-40B4-BE49-F238E27FC236}">
+                <a16:creationId xmlns:a16="http://schemas.microsoft.com/office/drawing/2014/main" id="{A5EF7789-4C3D-477D-B4CF-99DF20746072}"/>
+              </a:ext>
+            </a:extLst>
+          </p:cNvPr>
+          <p:cNvSpPr>
+            <a:spLocks noGrp="1"/>
+          </p:cNvSpPr>
+          <p:nvPr>
+            <p:ph type="body" sz="quarter" idx="13"/>
+          </p:nvPr>
+        </p:nvSpPr>
+        <p:spPr/>
+        <p:txBody>
+          <a:bodyPr anchor="ctr"/>
+          <a:lstStyle/>
+          <a:p>
+            <a:pPr algn="ctr"/>
+            <a:r>
+              <a:rPr lang="en-US" sz="3200"/>
+              <a:t>Reading assignments on Perusall</a:t>
+            </a:r>
+          </a:p>
+          <a:p>
+            <a:pPr algn="ctr"/>
+            <a:endParaRPr lang="en-US" sz="3200"/>
+          </a:p>
+          <a:p>
+            <a:pPr algn="ctr"/>
+            <a:r>
+              <a:rPr lang="en-US" sz="3200"/>
+              <a:t>Homework and Labs on InsideRanken</a:t>
+            </a:r>
+            <a:endParaRPr lang="en-US" sz="3200" dirty="0"/>
+          </a:p>
+        </p:txBody>
+      </p:sp>
+      <p:sp>
+        <p:nvSpPr>
+          <p:cNvPr id="4" name="Date Placeholder 3">
+            <a:extLst>
+              <a:ext uri="{FF2B5EF4-FFF2-40B4-BE49-F238E27FC236}">
+                <a16:creationId xmlns:a16="http://schemas.microsoft.com/office/drawing/2014/main" id="{81473463-BB85-42FA-8837-C86737525827}"/>
+              </a:ext>
+            </a:extLst>
+          </p:cNvPr>
+          <p:cNvSpPr>
+            <a:spLocks noGrp="1"/>
+          </p:cNvSpPr>
+          <p:nvPr>
+            <p:ph type="dt" sz="half" idx="14"/>
+          </p:nvPr>
+        </p:nvSpPr>
+        <p:spPr/>
+        <p:txBody>
+          <a:bodyPr/>
+          <a:lstStyle/>
+          <a:p>
+            <a:pPr>
+              <a:defRPr/>
+            </a:pPr>
+            <a:r>
+              <a:rPr lang="en-US"/>
+              <a:t>Murach's HTML and CSS, 4th Edition</a:t>
+            </a:r>
+            <a:endParaRPr lang="en-US" dirty="0"/>
+          </a:p>
+        </p:txBody>
+      </p:sp>
+      <p:sp>
+        <p:nvSpPr>
+          <p:cNvPr id="5" name="Footer Placeholder 4">
+            <a:extLst>
+              <a:ext uri="{FF2B5EF4-FFF2-40B4-BE49-F238E27FC236}">
+                <a16:creationId xmlns:a16="http://schemas.microsoft.com/office/drawing/2014/main" id="{18C45EC9-CFAA-4E64-AB28-567C018826E3}"/>
+              </a:ext>
+            </a:extLst>
+          </p:cNvPr>
+          <p:cNvSpPr>
+            <a:spLocks noGrp="1"/>
+          </p:cNvSpPr>
+          <p:nvPr>
+            <p:ph type="ftr" sz="quarter" idx="15"/>
+          </p:nvPr>
+        </p:nvSpPr>
+        <p:spPr/>
+        <p:txBody>
+          <a:bodyPr/>
+          <a:lstStyle/>
+          <a:p>
+            <a:pPr>
+              <a:defRPr/>
+            </a:pPr>
+            <a:r>
+              <a:rPr lang="en-US"/>
+              <a:t>© 2018, Mike Murach &amp; Associates, Inc.</a:t>
+            </a:r>
+            <a:endParaRPr lang="en-US" dirty="0"/>
+          </a:p>
+        </p:txBody>
+      </p:sp>
+      <p:sp>
+        <p:nvSpPr>
+          <p:cNvPr id="6" name="Slide Number Placeholder 5">
+            <a:extLst>
+              <a:ext uri="{FF2B5EF4-FFF2-40B4-BE49-F238E27FC236}">
+                <a16:creationId xmlns:a16="http://schemas.microsoft.com/office/drawing/2014/main" id="{D54283AA-0BB0-4D43-B198-DEEA3857E135}"/>
+              </a:ext>
+            </a:extLst>
+          </p:cNvPr>
+          <p:cNvSpPr>
+            <a:spLocks noGrp="1"/>
+          </p:cNvSpPr>
+          <p:nvPr>
+            <p:ph type="sldNum" sz="quarter" idx="16"/>
+          </p:nvPr>
+        </p:nvSpPr>
+        <p:spPr/>
+        <p:txBody>
+          <a:bodyPr/>
+          <a:lstStyle/>
+          <a:p>
+            <a:pPr algn="l">
+              <a:defRPr/>
+            </a:pPr>
+            <a:endParaRPr lang="en-US" sz="1400" dirty="0">
+              <a:latin typeface="Times New Roman"/>
+            </a:endParaRPr>
+          </a:p>
+          <a:p>
+            <a:pPr>
+              <a:defRPr/>
+            </a:pPr>
+            <a:r>
+              <a:rPr lang="en-US" dirty="0">
+                <a:solidFill>
+                  <a:schemeClr val="bg1"/>
+                </a:solidFill>
+              </a:rPr>
+              <a:t>C1, Slide </a:t>
+            </a:r>
+            <a:fld id="{BF5C1183-B085-4070-A402-C03A3F977D3D}" type="slidenum">
+              <a:rPr lang="en-US" smtClean="0">
+                <a:solidFill>
+                  <a:schemeClr val="bg1"/>
+                </a:solidFill>
+              </a:rPr>
+              <a:pPr>
+                <a:defRPr/>
+              </a:pPr>
+              <a:t>53</a:t>
+            </a:fld>
+            <a:endParaRPr lang="en-US" dirty="0">
+              <a:solidFill>
+                <a:schemeClr val="bg1"/>
+              </a:solidFill>
+            </a:endParaRPr>
+          </a:p>
+        </p:txBody>
+      </p:sp>
+    </p:spTree>
+    <p:extLst>
+      <p:ext uri="{BB962C8B-B14F-4D97-AF65-F5344CB8AC3E}">
+        <p14:creationId xmlns:p14="http://schemas.microsoft.com/office/powerpoint/2010/main" val="1776199089"/>
       </p:ext>
     </p:extLst>
   </p:cSld>

</xml_diff>